<commit_message>
minor update to slides
</commit_message>
<xml_diff>
--- a/slides/On-Campus/04_01_GitHub_IDE.pptx
+++ b/slides/On-Campus/04_01_GitHub_IDE.pptx
@@ -5862,12 +5862,12 @@
   </p:clrMapOvr>
   <mc:AlternateContent xmlns:mc="http://schemas.openxmlformats.org/markup-compatibility/2006">
     <mc:Choice xmlns:p14="http://schemas.microsoft.com/office/powerpoint/2010/main" Requires="p14">
-      <p:transition p14:dur="300" advTm="38129">
+      <p:transition p14:dur="300">
         <p:fade/>
       </p:transition>
     </mc:Choice>
     <mc:Fallback>
-      <p:transition advTm="38129">
+      <p:transition>
         <p:fade/>
       </p:transition>
     </mc:Fallback>
@@ -5978,12 +5978,12 @@
   </p:clrMapOvr>
   <mc:AlternateContent xmlns:mc="http://schemas.openxmlformats.org/markup-compatibility/2006">
     <mc:Choice xmlns:p14="http://schemas.microsoft.com/office/powerpoint/2010/main" Requires="p14">
-      <p:transition p14:dur="300" advTm="40270">
+      <p:transition p14:dur="300">
         <p:fade/>
       </p:transition>
     </mc:Choice>
     <mc:Fallback>
-      <p:transition advTm="40270">
+      <p:transition>
         <p:fade/>
       </p:transition>
     </mc:Fallback>
@@ -6673,12 +6673,12 @@
   </p:clrMapOvr>
   <mc:AlternateContent xmlns:mc="http://schemas.openxmlformats.org/markup-compatibility/2006">
     <mc:Choice xmlns:p14="http://schemas.microsoft.com/office/powerpoint/2010/main" Requires="p14">
-      <p:transition p14:dur="300" advTm="170509">
+      <p:transition p14:dur="300">
         <p:fade/>
       </p:transition>
     </mc:Choice>
     <mc:Fallback>
-      <p:transition advTm="170509">
+      <p:transition>
         <p:fade/>
       </p:transition>
     </mc:Fallback>
@@ -6882,12 +6882,12 @@
   </p:clrMapOvr>
   <mc:AlternateContent xmlns:mc="http://schemas.openxmlformats.org/markup-compatibility/2006">
     <mc:Choice xmlns:p14="http://schemas.microsoft.com/office/powerpoint/2010/main" Requires="p14">
-      <p:transition p14:dur="300" advTm="199979">
+      <p:transition p14:dur="300">
         <p:fade/>
       </p:transition>
     </mc:Choice>
     <mc:Fallback>
-      <p:transition advTm="199979">
+      <p:transition>
         <p:fade/>
       </p:transition>
     </mc:Fallback>
@@ -7101,12 +7101,12 @@
   </p:clrMapOvr>
   <mc:AlternateContent xmlns:mc="http://schemas.openxmlformats.org/markup-compatibility/2006">
     <mc:Choice xmlns:p14="http://schemas.microsoft.com/office/powerpoint/2010/main" Requires="p14">
-      <p:transition p14:dur="300" advTm="181599">
+      <p:transition p14:dur="300">
         <p:fade/>
       </p:transition>
     </mc:Choice>
     <mc:Fallback>
-      <p:transition advTm="181599">
+      <p:transition>
         <p:fade/>
       </p:transition>
     </mc:Fallback>
@@ -7343,12 +7343,12 @@
   </p:clrMapOvr>
   <mc:AlternateContent xmlns:mc="http://schemas.openxmlformats.org/markup-compatibility/2006">
     <mc:Choice xmlns:p14="http://schemas.microsoft.com/office/powerpoint/2010/main" Requires="p14">
-      <p:transition p14:dur="300" advTm="29108">
+      <p:transition p14:dur="300">
         <p:fade/>
       </p:transition>
     </mc:Choice>
     <mc:Fallback>
-      <p:transition advTm="29108">
+      <p:transition>
         <p:fade/>
       </p:transition>
     </mc:Fallback>
@@ -7516,12 +7516,12 @@
   </p:clrMapOvr>
   <mc:AlternateContent xmlns:mc="http://schemas.openxmlformats.org/markup-compatibility/2006">
     <mc:Choice xmlns:p14="http://schemas.microsoft.com/office/powerpoint/2010/main" Requires="p14">
-      <p:transition p14:dur="300" advTm="81753">
+      <p:transition p14:dur="300">
         <p:fade/>
       </p:transition>
     </mc:Choice>
     <mc:Fallback>
-      <p:transition advTm="81753">
+      <p:transition>
         <p:fade/>
       </p:transition>
     </mc:Fallback>
@@ -7722,12 +7722,12 @@
   </p:clrMapOvr>
   <mc:AlternateContent xmlns:mc="http://schemas.openxmlformats.org/markup-compatibility/2006">
     <mc:Choice xmlns:p14="http://schemas.microsoft.com/office/powerpoint/2010/main" Requires="p14">
-      <p:transition p14:dur="300" advTm="155321">
+      <p:transition p14:dur="300">
         <p:fade/>
       </p:transition>
     </mc:Choice>
     <mc:Fallback>
-      <p:transition advTm="155321">
+      <p:transition>
         <p:fade/>
       </p:transition>
     </mc:Fallback>

</xml_diff>